<commit_message>
Day 11 work notes updated
</commit_message>
<xml_diff>
--- a/Day11/DockerAndKubernetes_Training-Day11.pptx
+++ b/Day11/DockerAndKubernetes_Training-Day11.pptx
@@ -5,14 +5,15 @@
     <p:sldMasterId id="2147483880" r:id="rId1"/>
   </p:sldMasterIdLst>
   <p:notesMasterIdLst>
-    <p:notesMasterId r:id="rId7"/>
+    <p:notesMasterId r:id="rId8"/>
   </p:notesMasterIdLst>
   <p:sldIdLst>
     <p:sldId id="439" r:id="rId2"/>
     <p:sldId id="442" r:id="rId3"/>
-    <p:sldId id="266" r:id="rId4"/>
-    <p:sldId id="288" r:id="rId5"/>
-    <p:sldId id="438" r:id="rId6"/>
+    <p:sldId id="264" r:id="rId4"/>
+    <p:sldId id="266" r:id="rId5"/>
+    <p:sldId id="288" r:id="rId6"/>
+    <p:sldId id="438" r:id="rId7"/>
   </p:sldIdLst>
   <p:sldSz cx="12192000" cy="6858000"/>
   <p:notesSz cx="6858000" cy="9144000"/>
@@ -201,7 +202,7 @@
           <a:p>
             <a:fld id="{B09F413D-6E72-4B8A-80ED-A580F7C91B71}" type="datetimeFigureOut">
               <a:rPr lang="en-IN" smtClean="0"/>
-              <a:t>19-04-2023</a:t>
+              <a:t>20-04-2023</a:t>
             </a:fld>
             <a:endParaRPr lang="en-IN"/>
           </a:p>
@@ -469,6 +470,90 @@
 </p:notesMaster>
 </file>
 
+<file path=ppt/notesSlides/notesSlide1.xml><?xml version="1.0" encoding="utf-8"?>
+<p:notes xmlns:a="http://schemas.openxmlformats.org/drawingml/2006/main" xmlns:r="http://schemas.openxmlformats.org/officeDocument/2006/relationships" xmlns:p="http://schemas.openxmlformats.org/presentationml/2006/main">
+  <p:cSld>
+    <p:spTree>
+      <p:nvGrpSpPr>
+        <p:cNvPr id="1" name=""/>
+        <p:cNvGrpSpPr/>
+        <p:nvPr/>
+      </p:nvGrpSpPr>
+      <p:grpSpPr>
+        <a:xfrm>
+          <a:off x="0" y="0"/>
+          <a:ext cx="0" cy="0"/>
+          <a:chOff x="0" y="0"/>
+          <a:chExt cx="0" cy="0"/>
+        </a:xfrm>
+      </p:grpSpPr>
+      <p:sp>
+        <p:nvSpPr>
+          <p:cNvPr id="2" name="Slide Image Placeholder 1"/>
+          <p:cNvSpPr>
+            <a:spLocks noGrp="1" noRot="1" noChangeAspect="1"/>
+          </p:cNvSpPr>
+          <p:nvPr>
+            <p:ph type="sldImg"/>
+          </p:nvPr>
+        </p:nvSpPr>
+        <p:spPr/>
+      </p:sp>
+      <p:sp>
+        <p:nvSpPr>
+          <p:cNvPr id="3" name="Notes Placeholder 2"/>
+          <p:cNvSpPr>
+            <a:spLocks noGrp="1"/>
+          </p:cNvSpPr>
+          <p:nvPr>
+            <p:ph type="body" idx="1"/>
+          </p:nvPr>
+        </p:nvSpPr>
+        <p:spPr/>
+        <p:txBody>
+          <a:bodyPr/>
+          <a:lstStyle/>
+          <a:p>
+            <a:endParaRPr lang="en-IN" dirty="0"/>
+          </a:p>
+        </p:txBody>
+      </p:sp>
+      <p:sp>
+        <p:nvSpPr>
+          <p:cNvPr id="4" name="Slide Number Placeholder 3"/>
+          <p:cNvSpPr>
+            <a:spLocks noGrp="1"/>
+          </p:cNvSpPr>
+          <p:nvPr>
+            <p:ph type="sldNum" sz="quarter" idx="5"/>
+          </p:nvPr>
+        </p:nvSpPr>
+        <p:spPr/>
+        <p:txBody>
+          <a:bodyPr/>
+          <a:lstStyle/>
+          <a:p>
+            <a:fld id="{6A606295-A8FB-4F0B-A402-E245B71E1CAD}" type="slidenum">
+              <a:rPr lang="en-IN" smtClean="0"/>
+              <a:t>2</a:t>
+            </a:fld>
+            <a:endParaRPr lang="en-IN"/>
+          </a:p>
+        </p:txBody>
+      </p:sp>
+    </p:spTree>
+    <p:extLst>
+      <p:ext uri="{BB962C8B-B14F-4D97-AF65-F5344CB8AC3E}">
+        <p14:creationId xmlns:p14="http://schemas.microsoft.com/office/powerpoint/2010/main" val="3054424712"/>
+      </p:ext>
+    </p:extLst>
+  </p:cSld>
+  <p:clrMapOvr>
+    <a:masterClrMapping/>
+  </p:clrMapOvr>
+</p:notes>
+</file>
+
 <file path=ppt/slideLayouts/slideLayout1.xml><?xml version="1.0" encoding="utf-8"?>
 <p:sldLayout xmlns:a="http://schemas.openxmlformats.org/drawingml/2006/main" xmlns:r="http://schemas.openxmlformats.org/officeDocument/2006/relationships" xmlns:p="http://schemas.openxmlformats.org/presentationml/2006/main" showMasterSp="0" type="title" preserve="1">
   <p:cSld name="Title Slide">
@@ -804,7 +889,7 @@
           <a:p>
             <a:fld id="{12E8600E-B0EE-4521-BF40-4B72FBA06775}" type="datetimeFigureOut">
               <a:rPr lang="en-IN" smtClean="0"/>
-              <a:t>19-04-2023</a:t>
+              <a:t>20-04-2023</a:t>
             </a:fld>
             <a:endParaRPr lang="en-IN"/>
           </a:p>
@@ -1893,7 +1978,7 @@
             <a:fld id="{49F3E739-D457-46E5-B626-C9B182A007EE}" type="datetimeFigureOut">
               <a:rPr lang="en-US" smtClean="0"/>
               <a:pPr/>
-              <a:t>4/19/2023</a:t>
+              <a:t>4/20/2023</a:t>
             </a:fld>
             <a:endParaRPr lang="en-US"/>
           </a:p>
@@ -2875,7 +2960,7 @@
             <a:fld id="{49F3E739-D457-46E5-B626-C9B182A007EE}" type="datetimeFigureOut">
               <a:rPr lang="en-US" smtClean="0"/>
               <a:pPr/>
-              <a:t>4/19/2023</a:t>
+              <a:t>4/20/2023</a:t>
             </a:fld>
             <a:endParaRPr lang="en-US"/>
           </a:p>
@@ -4011,7 +4096,7 @@
             <a:fld id="{49F3E739-D457-46E5-B626-C9B182A007EE}" type="datetimeFigureOut">
               <a:rPr lang="en-US" smtClean="0"/>
               <a:pPr/>
-              <a:t>4/19/2023</a:t>
+              <a:t>4/20/2023</a:t>
             </a:fld>
             <a:endParaRPr lang="en-US"/>
           </a:p>
@@ -5046,7 +5131,7 @@
             <a:fld id="{49F3E739-D457-46E5-B626-C9B182A007EE}" type="datetimeFigureOut">
               <a:rPr lang="en-US" smtClean="0"/>
               <a:pPr/>
-              <a:t>4/19/2023</a:t>
+              <a:t>4/20/2023</a:t>
             </a:fld>
             <a:endParaRPr lang="en-US"/>
           </a:p>
@@ -5708,7 +5793,7 @@
             <a:fld id="{49F3E739-D457-46E5-B626-C9B182A007EE}" type="datetimeFigureOut">
               <a:rPr lang="en-US" smtClean="0"/>
               <a:pPr/>
-              <a:t>4/19/2023</a:t>
+              <a:t>4/20/2023</a:t>
             </a:fld>
             <a:endParaRPr lang="en-US"/>
           </a:p>
@@ -6571,7 +6656,7 @@
             <a:fld id="{49F3E739-D457-46E5-B626-C9B182A007EE}" type="datetimeFigureOut">
               <a:rPr lang="en-US" smtClean="0"/>
               <a:pPr/>
-              <a:t>4/19/2023</a:t>
+              <a:t>4/20/2023</a:t>
             </a:fld>
             <a:endParaRPr lang="en-US"/>
           </a:p>
@@ -6762,7 +6847,7 @@
           <a:p>
             <a:fld id="{12E8600E-B0EE-4521-BF40-4B72FBA06775}" type="datetimeFigureOut">
               <a:rPr lang="en-IN" smtClean="0"/>
-              <a:t>19-04-2023</a:t>
+              <a:t>20-04-2023</a:t>
             </a:fld>
             <a:endParaRPr lang="en-IN"/>
           </a:p>
@@ -7734,7 +7819,7 @@
           <a:p>
             <a:fld id="{12E8600E-B0EE-4521-BF40-4B72FBA06775}" type="datetimeFigureOut">
               <a:rPr lang="en-IN" smtClean="0"/>
-              <a:t>19-04-2023</a:t>
+              <a:t>20-04-2023</a:t>
             </a:fld>
             <a:endParaRPr lang="en-IN"/>
           </a:p>
@@ -7945,7 +8030,7 @@
           <a:p>
             <a:fld id="{12E8600E-B0EE-4521-BF40-4B72FBA06775}" type="datetimeFigureOut">
               <a:rPr lang="en-IN" smtClean="0"/>
-              <a:t>19-04-2023</a:t>
+              <a:t>20-04-2023</a:t>
             </a:fld>
             <a:endParaRPr lang="en-IN"/>
           </a:p>
@@ -8979,7 +9064,7 @@
           <a:p>
             <a:fld id="{12E8600E-B0EE-4521-BF40-4B72FBA06775}" type="datetimeFigureOut">
               <a:rPr lang="en-IN" smtClean="0"/>
-              <a:t>19-04-2023</a:t>
+              <a:t>20-04-2023</a:t>
             </a:fld>
             <a:endParaRPr lang="en-IN"/>
           </a:p>
@@ -9251,7 +9336,7 @@
           <a:p>
             <a:fld id="{12E8600E-B0EE-4521-BF40-4B72FBA06775}" type="datetimeFigureOut">
               <a:rPr lang="en-IN" smtClean="0"/>
-              <a:t>19-04-2023</a:t>
+              <a:t>20-04-2023</a:t>
             </a:fld>
             <a:endParaRPr lang="en-IN"/>
           </a:p>
@@ -9662,7 +9747,7 @@
             <a:fld id="{49F3E739-D457-46E5-B626-C9B182A007EE}" type="datetimeFigureOut">
               <a:rPr lang="en-US" smtClean="0"/>
               <a:pPr/>
-              <a:t>4/19/2023</a:t>
+              <a:t>4/20/2023</a:t>
             </a:fld>
             <a:endParaRPr lang="en-US"/>
           </a:p>
@@ -9790,7 +9875,7 @@
           <a:p>
             <a:fld id="{12E8600E-B0EE-4521-BF40-4B72FBA06775}" type="datetimeFigureOut">
               <a:rPr lang="en-IN" smtClean="0"/>
-              <a:t>19-04-2023</a:t>
+              <a:t>20-04-2023</a:t>
             </a:fld>
             <a:endParaRPr lang="en-IN"/>
           </a:p>
@@ -9885,7 +9970,7 @@
           <a:p>
             <a:fld id="{12E8600E-B0EE-4521-BF40-4B72FBA06775}" type="datetimeFigureOut">
               <a:rPr lang="en-IN" smtClean="0"/>
-              <a:t>19-04-2023</a:t>
+              <a:t>20-04-2023</a:t>
             </a:fld>
             <a:endParaRPr lang="en-IN"/>
           </a:p>
@@ -10966,7 +11051,7 @@
           <a:p>
             <a:fld id="{12E8600E-B0EE-4521-BF40-4B72FBA06775}" type="datetimeFigureOut">
               <a:rPr lang="en-IN" smtClean="0"/>
-              <a:t>19-04-2023</a:t>
+              <a:t>20-04-2023</a:t>
             </a:fld>
             <a:endParaRPr lang="en-IN"/>
           </a:p>
@@ -12075,7 +12160,7 @@
             <a:fld id="{49F3E739-D457-46E5-B626-C9B182A007EE}" type="datetimeFigureOut">
               <a:rPr lang="en-US" smtClean="0"/>
               <a:pPr/>
-              <a:t>4/19/2023</a:t>
+              <a:t>4/20/2023</a:t>
             </a:fld>
             <a:endParaRPr lang="en-US"/>
           </a:p>
@@ -13074,7 +13159,7 @@
             <a:fld id="{49F3E739-D457-46E5-B626-C9B182A007EE}" type="datetimeFigureOut">
               <a:rPr lang="en-US" smtClean="0"/>
               <a:pPr/>
-              <a:t>4/19/2023</a:t>
+              <a:t>4/20/2023</a:t>
             </a:fld>
             <a:endParaRPr lang="en-US"/>
           </a:p>
@@ -13662,7 +13747,7 @@
           <a:p>
             <a:r>
               <a:rPr lang="en-US" sz="4800" b="1" i="1" dirty="0"/>
-              <a:t>DAY 10</a:t>
+              <a:t>DAY 11</a:t>
             </a:r>
             <a:endParaRPr lang="en-IN" sz="4800" b="1" i="1" dirty="0"/>
           </a:p>
@@ -14039,6 +14124,26 @@
           <a:p>
             <a:r>
               <a:rPr lang="en-US" dirty="0"/>
+              <a:t>Docker Network</a:t>
+            </a:r>
+          </a:p>
+          <a:p>
+            <a:pPr lvl="1"/>
+            <a:r>
+              <a:rPr lang="en-US" dirty="0"/>
+              <a:t>Default/Bridge/None/Host/Overlay</a:t>
+            </a:r>
+          </a:p>
+          <a:p>
+            <a:pPr lvl="1"/>
+            <a:r>
+              <a:rPr lang="en-US" dirty="0"/>
+              <a:t>Customized bridge network</a:t>
+            </a:r>
+          </a:p>
+          <a:p>
+            <a:r>
+              <a:rPr lang="en-US" dirty="0"/>
               <a:t>YAML understanding</a:t>
             </a:r>
           </a:p>
@@ -14051,13 +14156,13 @@
           <a:p>
             <a:r>
               <a:rPr lang="en-US" dirty="0"/>
-              <a:t>Docker Compose file – Example/Brief</a:t>
+              <a:t>Docker Compose evolution - Versions</a:t>
             </a:r>
           </a:p>
           <a:p>
             <a:r>
               <a:rPr lang="en-US" dirty="0"/>
-              <a:t>Docker Network</a:t>
+              <a:t>Docker Compose file – Example/Brief</a:t>
             </a:r>
           </a:p>
           <a:p>
@@ -14096,6 +14201,1170 @@
 </file>
 
 <file path=ppt/slides/slide3.xml><?xml version="1.0" encoding="utf-8"?>
+<p:sld xmlns:a="http://schemas.openxmlformats.org/drawingml/2006/main" xmlns:r="http://schemas.openxmlformats.org/officeDocument/2006/relationships" xmlns:p="http://schemas.openxmlformats.org/presentationml/2006/main">
+  <p:cSld>
+    <p:spTree>
+      <p:nvGrpSpPr>
+        <p:cNvPr id="1" name=""/>
+        <p:cNvGrpSpPr/>
+        <p:nvPr/>
+      </p:nvGrpSpPr>
+      <p:grpSpPr>
+        <a:xfrm>
+          <a:off x="0" y="0"/>
+          <a:ext cx="0" cy="0"/>
+          <a:chOff x="0" y="0"/>
+          <a:chExt cx="0" cy="0"/>
+        </a:xfrm>
+      </p:grpSpPr>
+      <p:sp>
+        <p:nvSpPr>
+          <p:cNvPr id="2" name="Title 1">
+            <a:extLst>
+              <a:ext uri="{FF2B5EF4-FFF2-40B4-BE49-F238E27FC236}">
+                <a16:creationId xmlns:a16="http://schemas.microsoft.com/office/drawing/2014/main" id="{97BC34CC-2191-086A-75CD-07624340C7B3}"/>
+              </a:ext>
+            </a:extLst>
+          </p:cNvPr>
+          <p:cNvSpPr>
+            <a:spLocks noGrp="1"/>
+          </p:cNvSpPr>
+          <p:nvPr>
+            <p:ph type="title"/>
+          </p:nvPr>
+        </p:nvSpPr>
+        <p:spPr/>
+        <p:txBody>
+          <a:bodyPr/>
+          <a:lstStyle/>
+          <a:p>
+            <a:r>
+              <a:rPr lang="en-US" dirty="0"/>
+              <a:t>DOCKER NETWORKS</a:t>
+            </a:r>
+            <a:endParaRPr lang="en-IN" dirty="0"/>
+          </a:p>
+        </p:txBody>
+      </p:sp>
+      <p:sp>
+        <p:nvSpPr>
+          <p:cNvPr id="16" name="Content Placeholder 2">
+            <a:extLst>
+              <a:ext uri="{FF2B5EF4-FFF2-40B4-BE49-F238E27FC236}">
+                <a16:creationId xmlns:a16="http://schemas.microsoft.com/office/drawing/2014/main" id="{485BE739-1319-EBF7-C754-170063DE1730}"/>
+              </a:ext>
+            </a:extLst>
+          </p:cNvPr>
+          <p:cNvSpPr>
+            <a:spLocks noGrp="1"/>
+          </p:cNvSpPr>
+          <p:nvPr>
+            <p:ph idx="1"/>
+          </p:nvPr>
+        </p:nvSpPr>
+        <p:spPr>
+          <a:xfrm>
+            <a:off x="6785111" y="2343819"/>
+            <a:ext cx="5499654" cy="2294442"/>
+          </a:xfrm>
+        </p:spPr>
+        <p:txBody>
+          <a:bodyPr>
+            <a:noAutofit/>
+          </a:bodyPr>
+          <a:lstStyle/>
+          <a:p>
+            <a:r>
+              <a:rPr lang="en-US" sz="1400" b="1" i="1" dirty="0"/>
+              <a:t>Docker Network Drivers</a:t>
+            </a:r>
+          </a:p>
+          <a:p>
+            <a:pPr lvl="1">
+              <a:buFont typeface="Wingdings" panose="05000000000000000000" pitchFamily="2" charset="2"/>
+              <a:buChar char="Ø"/>
+            </a:pPr>
+            <a:r>
+              <a:rPr lang="en-US" sz="1200" b="1" dirty="0"/>
+              <a:t>Bridge N/W</a:t>
+            </a:r>
+            <a:r>
+              <a:rPr lang="en-US" sz="1200" dirty="0"/>
+              <a:t>: Private default n/w, container linked to internal IP addresses</a:t>
+            </a:r>
+          </a:p>
+          <a:p>
+            <a:pPr lvl="1">
+              <a:buFont typeface="Wingdings" panose="05000000000000000000" pitchFamily="2" charset="2"/>
+              <a:buChar char="Ø"/>
+            </a:pPr>
+            <a:r>
+              <a:rPr lang="en-US" sz="1200" b="1" dirty="0"/>
+              <a:t>Host N/W</a:t>
+            </a:r>
+            <a:r>
+              <a:rPr lang="en-US" sz="1200" dirty="0"/>
+              <a:t>: Public n/w, utilize host IP addresses</a:t>
+            </a:r>
+          </a:p>
+          <a:p>
+            <a:pPr lvl="1">
+              <a:buFont typeface="Wingdings" panose="05000000000000000000" pitchFamily="2" charset="2"/>
+              <a:buChar char="Ø"/>
+            </a:pPr>
+            <a:r>
+              <a:rPr lang="en-US" sz="1200" b="1" dirty="0"/>
+              <a:t>None</a:t>
+            </a:r>
+            <a:r>
+              <a:rPr lang="en-US" sz="1200" dirty="0"/>
+              <a:t>: No external interface, for disabling container n/w</a:t>
+            </a:r>
+          </a:p>
+          <a:p>
+            <a:pPr lvl="1">
+              <a:buFont typeface="Wingdings" panose="05000000000000000000" pitchFamily="2" charset="2"/>
+              <a:buChar char="Ø"/>
+            </a:pPr>
+            <a:r>
+              <a:rPr lang="en-US" sz="1200" b="1" dirty="0"/>
+              <a:t>Overlay</a:t>
+            </a:r>
+            <a:r>
+              <a:rPr lang="en-US" sz="1200" dirty="0"/>
+              <a:t>: For Docker Swarm cluster, internal private n/w to the Docker nodes</a:t>
+            </a:r>
+          </a:p>
+          <a:p>
+            <a:pPr lvl="1">
+              <a:buFont typeface="Wingdings" panose="05000000000000000000" pitchFamily="2" charset="2"/>
+              <a:buChar char="Ø"/>
+            </a:pPr>
+            <a:r>
+              <a:rPr lang="en-US" sz="1200" b="1" dirty="0" err="1"/>
+              <a:t>Macvlan</a:t>
+            </a:r>
+            <a:r>
+              <a:rPr lang="en-US" sz="1200" dirty="0"/>
+              <a:t>: For simplified communication b/w containers using MAC address</a:t>
+            </a:r>
+            <a:endParaRPr lang="en-IN" sz="1200" dirty="0"/>
+          </a:p>
+        </p:txBody>
+      </p:sp>
+      <p:pic>
+        <p:nvPicPr>
+          <p:cNvPr id="8" name="Picture 7">
+            <a:extLst>
+              <a:ext uri="{FF2B5EF4-FFF2-40B4-BE49-F238E27FC236}">
+                <a16:creationId xmlns:a16="http://schemas.microsoft.com/office/drawing/2014/main" id="{215853EE-E050-2E08-7AE1-80297B2876DB}"/>
+              </a:ext>
+            </a:extLst>
+          </p:cNvPr>
+          <p:cNvPicPr>
+            <a:picLocks noChangeAspect="1"/>
+          </p:cNvPicPr>
+          <p:nvPr/>
+        </p:nvPicPr>
+        <p:blipFill>
+          <a:blip r:embed="rId2">
+            <a:extLst>
+              <a:ext uri="{28A0092B-C50C-407E-A947-70E740481C1C}">
+                <a14:useLocalDpi xmlns:a14="http://schemas.microsoft.com/office/drawing/2010/main" val="0"/>
+              </a:ext>
+            </a:extLst>
+          </a:blip>
+          <a:stretch>
+            <a:fillRect/>
+          </a:stretch>
+        </p:blipFill>
+        <p:spPr>
+          <a:xfrm>
+            <a:off x="0" y="2343819"/>
+            <a:ext cx="6904590" cy="4401537"/>
+          </a:xfrm>
+          <a:prstGeom prst="rect">
+            <a:avLst/>
+          </a:prstGeom>
+        </p:spPr>
+      </p:pic>
+      <p:pic>
+        <p:nvPicPr>
+          <p:cNvPr id="12" name="Picture 11">
+            <a:extLst>
+              <a:ext uri="{FF2B5EF4-FFF2-40B4-BE49-F238E27FC236}">
+                <a16:creationId xmlns:a16="http://schemas.microsoft.com/office/drawing/2014/main" id="{FE5B390B-8058-E584-11C9-B16AAEF122FD}"/>
+              </a:ext>
+            </a:extLst>
+          </p:cNvPr>
+          <p:cNvPicPr>
+            <a:picLocks noChangeAspect="1"/>
+          </p:cNvPicPr>
+          <p:nvPr/>
+        </p:nvPicPr>
+        <p:blipFill>
+          <a:blip r:embed="rId3">
+            <a:extLst>
+              <a:ext uri="{28A0092B-C50C-407E-A947-70E740481C1C}">
+                <a14:useLocalDpi xmlns:a14="http://schemas.microsoft.com/office/drawing/2010/main" val="0"/>
+              </a:ext>
+            </a:extLst>
+          </a:blip>
+          <a:stretch>
+            <a:fillRect/>
+          </a:stretch>
+        </p:blipFill>
+        <p:spPr>
+          <a:xfrm>
+            <a:off x="6904589" y="4784035"/>
+            <a:ext cx="5194645" cy="1961321"/>
+          </a:xfrm>
+          <a:prstGeom prst="rect">
+            <a:avLst/>
+          </a:prstGeom>
+        </p:spPr>
+      </p:pic>
+    </p:spTree>
+    <p:extLst>
+      <p:ext uri="{BB962C8B-B14F-4D97-AF65-F5344CB8AC3E}">
+        <p14:creationId xmlns:p14="http://schemas.microsoft.com/office/powerpoint/2010/main" val="368692874"/>
+      </p:ext>
+    </p:extLst>
+  </p:cSld>
+  <p:clrMapOvr>
+    <a:masterClrMapping/>
+  </p:clrMapOvr>
+  <mc:AlternateContent xmlns:mc="http://schemas.openxmlformats.org/markup-compatibility/2006" xmlns:p14="http://schemas.microsoft.com/office/powerpoint/2010/main">
+    <mc:Choice Requires="p14">
+      <p:transition spd="med" p14:dur="700">
+        <p:fade/>
+      </p:transition>
+    </mc:Choice>
+    <mc:Fallback xmlns="">
+      <p:transition spd="med">
+        <p:fade/>
+      </p:transition>
+    </mc:Fallback>
+  </mc:AlternateContent>
+  <p:timing>
+    <p:tnLst>
+      <p:par>
+        <p:cTn id="1" dur="indefinite" restart="never" nodeType="tmRoot">
+          <p:childTnLst>
+            <p:seq concurrent="1" nextAc="seek">
+              <p:cTn id="2" dur="indefinite" nodeType="mainSeq">
+                <p:childTnLst>
+                  <p:par>
+                    <p:cTn id="3" fill="hold">
+                      <p:stCondLst>
+                        <p:cond delay="indefinite"/>
+                      </p:stCondLst>
+                      <p:childTnLst>
+                        <p:par>
+                          <p:cTn id="4" fill="hold">
+                            <p:stCondLst>
+                              <p:cond delay="0"/>
+                            </p:stCondLst>
+                            <p:childTnLst>
+                              <p:par>
+                                <p:cTn id="5" presetID="2" presetClass="entr" presetSubtype="4" fill="hold" grpId="0" nodeType="clickEffect">
+                                  <p:stCondLst>
+                                    <p:cond delay="0"/>
+                                  </p:stCondLst>
+                                  <p:childTnLst>
+                                    <p:set>
+                                      <p:cBhvr>
+                                        <p:cTn id="6" dur="1" fill="hold">
+                                          <p:stCondLst>
+                                            <p:cond delay="0"/>
+                                          </p:stCondLst>
+                                        </p:cTn>
+                                        <p:tgtEl>
+                                          <p:spTgt spid="2"/>
+                                        </p:tgtEl>
+                                        <p:attrNameLst>
+                                          <p:attrName>style.visibility</p:attrName>
+                                        </p:attrNameLst>
+                                      </p:cBhvr>
+                                      <p:to>
+                                        <p:strVal val="visible"/>
+                                      </p:to>
+                                    </p:set>
+                                    <p:anim calcmode="lin" valueType="num">
+                                      <p:cBhvr additive="base">
+                                        <p:cTn id="7" dur="500" fill="hold"/>
+                                        <p:tgtEl>
+                                          <p:spTgt spid="2"/>
+                                        </p:tgtEl>
+                                        <p:attrNameLst>
+                                          <p:attrName>ppt_x</p:attrName>
+                                        </p:attrNameLst>
+                                      </p:cBhvr>
+                                      <p:tavLst>
+                                        <p:tav tm="0">
+                                          <p:val>
+                                            <p:strVal val="#ppt_x"/>
+                                          </p:val>
+                                        </p:tav>
+                                        <p:tav tm="100000">
+                                          <p:val>
+                                            <p:strVal val="#ppt_x"/>
+                                          </p:val>
+                                        </p:tav>
+                                      </p:tavLst>
+                                    </p:anim>
+                                    <p:anim calcmode="lin" valueType="num">
+                                      <p:cBhvr additive="base">
+                                        <p:cTn id="8" dur="500" fill="hold"/>
+                                        <p:tgtEl>
+                                          <p:spTgt spid="2"/>
+                                        </p:tgtEl>
+                                        <p:attrNameLst>
+                                          <p:attrName>ppt_y</p:attrName>
+                                        </p:attrNameLst>
+                                      </p:cBhvr>
+                                      <p:tavLst>
+                                        <p:tav tm="0">
+                                          <p:val>
+                                            <p:strVal val="1+#ppt_h/2"/>
+                                          </p:val>
+                                        </p:tav>
+                                        <p:tav tm="100000">
+                                          <p:val>
+                                            <p:strVal val="#ppt_y"/>
+                                          </p:val>
+                                        </p:tav>
+                                      </p:tavLst>
+                                    </p:anim>
+                                  </p:childTnLst>
+                                </p:cTn>
+                              </p:par>
+                            </p:childTnLst>
+                          </p:cTn>
+                        </p:par>
+                      </p:childTnLst>
+                    </p:cTn>
+                  </p:par>
+                  <p:par>
+                    <p:cTn id="9" fill="hold">
+                      <p:stCondLst>
+                        <p:cond delay="indefinite"/>
+                      </p:stCondLst>
+                      <p:childTnLst>
+                        <p:par>
+                          <p:cTn id="10" fill="hold">
+                            <p:stCondLst>
+                              <p:cond delay="0"/>
+                            </p:stCondLst>
+                            <p:childTnLst>
+                              <p:par>
+                                <p:cTn id="11" presetID="2" presetClass="entr" presetSubtype="4" fill="hold" nodeType="clickEffect">
+                                  <p:stCondLst>
+                                    <p:cond delay="0"/>
+                                  </p:stCondLst>
+                                  <p:childTnLst>
+                                    <p:set>
+                                      <p:cBhvr>
+                                        <p:cTn id="12" dur="1" fill="hold">
+                                          <p:stCondLst>
+                                            <p:cond delay="0"/>
+                                          </p:stCondLst>
+                                        </p:cTn>
+                                        <p:tgtEl>
+                                          <p:spTgt spid="8"/>
+                                        </p:tgtEl>
+                                        <p:attrNameLst>
+                                          <p:attrName>style.visibility</p:attrName>
+                                        </p:attrNameLst>
+                                      </p:cBhvr>
+                                      <p:to>
+                                        <p:strVal val="visible"/>
+                                      </p:to>
+                                    </p:set>
+                                    <p:anim calcmode="lin" valueType="num">
+                                      <p:cBhvr additive="base">
+                                        <p:cTn id="13" dur="500" fill="hold"/>
+                                        <p:tgtEl>
+                                          <p:spTgt spid="8"/>
+                                        </p:tgtEl>
+                                        <p:attrNameLst>
+                                          <p:attrName>ppt_x</p:attrName>
+                                        </p:attrNameLst>
+                                      </p:cBhvr>
+                                      <p:tavLst>
+                                        <p:tav tm="0">
+                                          <p:val>
+                                            <p:strVal val="#ppt_x"/>
+                                          </p:val>
+                                        </p:tav>
+                                        <p:tav tm="100000">
+                                          <p:val>
+                                            <p:strVal val="#ppt_x"/>
+                                          </p:val>
+                                        </p:tav>
+                                      </p:tavLst>
+                                    </p:anim>
+                                    <p:anim calcmode="lin" valueType="num">
+                                      <p:cBhvr additive="base">
+                                        <p:cTn id="14" dur="500" fill="hold"/>
+                                        <p:tgtEl>
+                                          <p:spTgt spid="8"/>
+                                        </p:tgtEl>
+                                        <p:attrNameLst>
+                                          <p:attrName>ppt_y</p:attrName>
+                                        </p:attrNameLst>
+                                      </p:cBhvr>
+                                      <p:tavLst>
+                                        <p:tav tm="0">
+                                          <p:val>
+                                            <p:strVal val="1+#ppt_h/2"/>
+                                          </p:val>
+                                        </p:tav>
+                                        <p:tav tm="100000">
+                                          <p:val>
+                                            <p:strVal val="#ppt_y"/>
+                                          </p:val>
+                                        </p:tav>
+                                      </p:tavLst>
+                                    </p:anim>
+                                  </p:childTnLst>
+                                </p:cTn>
+                              </p:par>
+                            </p:childTnLst>
+                          </p:cTn>
+                        </p:par>
+                      </p:childTnLst>
+                    </p:cTn>
+                  </p:par>
+                  <p:par>
+                    <p:cTn id="15" fill="hold">
+                      <p:stCondLst>
+                        <p:cond delay="indefinite"/>
+                      </p:stCondLst>
+                      <p:childTnLst>
+                        <p:par>
+                          <p:cTn id="16" fill="hold">
+                            <p:stCondLst>
+                              <p:cond delay="0"/>
+                            </p:stCondLst>
+                            <p:childTnLst>
+                              <p:par>
+                                <p:cTn id="17" presetID="42" presetClass="entr" presetSubtype="0" fill="hold" grpId="0" nodeType="clickEffect">
+                                  <p:stCondLst>
+                                    <p:cond delay="0"/>
+                                  </p:stCondLst>
+                                  <p:childTnLst>
+                                    <p:set>
+                                      <p:cBhvr>
+                                        <p:cTn id="18" dur="1" fill="hold">
+                                          <p:stCondLst>
+                                            <p:cond delay="0"/>
+                                          </p:stCondLst>
+                                        </p:cTn>
+                                        <p:tgtEl>
+                                          <p:spTgt spid="16">
+                                            <p:txEl>
+                                              <p:pRg st="0" end="0"/>
+                                            </p:txEl>
+                                          </p:spTgt>
+                                        </p:tgtEl>
+                                        <p:attrNameLst>
+                                          <p:attrName>style.visibility</p:attrName>
+                                        </p:attrNameLst>
+                                      </p:cBhvr>
+                                      <p:to>
+                                        <p:strVal val="visible"/>
+                                      </p:to>
+                                    </p:set>
+                                    <p:animEffect transition="in" filter="fade">
+                                      <p:cBhvr>
+                                        <p:cTn id="19" dur="1000"/>
+                                        <p:tgtEl>
+                                          <p:spTgt spid="16">
+                                            <p:txEl>
+                                              <p:pRg st="0" end="0"/>
+                                            </p:txEl>
+                                          </p:spTgt>
+                                        </p:tgtEl>
+                                      </p:cBhvr>
+                                    </p:animEffect>
+                                    <p:anim calcmode="lin" valueType="num">
+                                      <p:cBhvr>
+                                        <p:cTn id="20" dur="1000" fill="hold"/>
+                                        <p:tgtEl>
+                                          <p:spTgt spid="16">
+                                            <p:txEl>
+                                              <p:pRg st="0" end="0"/>
+                                            </p:txEl>
+                                          </p:spTgt>
+                                        </p:tgtEl>
+                                        <p:attrNameLst>
+                                          <p:attrName>ppt_x</p:attrName>
+                                        </p:attrNameLst>
+                                      </p:cBhvr>
+                                      <p:tavLst>
+                                        <p:tav tm="0">
+                                          <p:val>
+                                            <p:strVal val="#ppt_x"/>
+                                          </p:val>
+                                        </p:tav>
+                                        <p:tav tm="100000">
+                                          <p:val>
+                                            <p:strVal val="#ppt_x"/>
+                                          </p:val>
+                                        </p:tav>
+                                      </p:tavLst>
+                                    </p:anim>
+                                    <p:anim calcmode="lin" valueType="num">
+                                      <p:cBhvr>
+                                        <p:cTn id="21" dur="1000" fill="hold"/>
+                                        <p:tgtEl>
+                                          <p:spTgt spid="16">
+                                            <p:txEl>
+                                              <p:pRg st="0" end="0"/>
+                                            </p:txEl>
+                                          </p:spTgt>
+                                        </p:tgtEl>
+                                        <p:attrNameLst>
+                                          <p:attrName>ppt_y</p:attrName>
+                                        </p:attrNameLst>
+                                      </p:cBhvr>
+                                      <p:tavLst>
+                                        <p:tav tm="0">
+                                          <p:val>
+                                            <p:strVal val="#ppt_y+.1"/>
+                                          </p:val>
+                                        </p:tav>
+                                        <p:tav tm="100000">
+                                          <p:val>
+                                            <p:strVal val="#ppt_y"/>
+                                          </p:val>
+                                        </p:tav>
+                                      </p:tavLst>
+                                    </p:anim>
+                                  </p:childTnLst>
+                                </p:cTn>
+                              </p:par>
+                              <p:par>
+                                <p:cTn id="22" presetID="42" presetClass="entr" presetSubtype="0" fill="hold" grpId="0" nodeType="withEffect">
+                                  <p:stCondLst>
+                                    <p:cond delay="0"/>
+                                  </p:stCondLst>
+                                  <p:childTnLst>
+                                    <p:set>
+                                      <p:cBhvr>
+                                        <p:cTn id="23" dur="1" fill="hold">
+                                          <p:stCondLst>
+                                            <p:cond delay="0"/>
+                                          </p:stCondLst>
+                                        </p:cTn>
+                                        <p:tgtEl>
+                                          <p:spTgt spid="16">
+                                            <p:txEl>
+                                              <p:pRg st="1" end="1"/>
+                                            </p:txEl>
+                                          </p:spTgt>
+                                        </p:tgtEl>
+                                        <p:attrNameLst>
+                                          <p:attrName>style.visibility</p:attrName>
+                                        </p:attrNameLst>
+                                      </p:cBhvr>
+                                      <p:to>
+                                        <p:strVal val="visible"/>
+                                      </p:to>
+                                    </p:set>
+                                    <p:animEffect transition="in" filter="fade">
+                                      <p:cBhvr>
+                                        <p:cTn id="24" dur="1000"/>
+                                        <p:tgtEl>
+                                          <p:spTgt spid="16">
+                                            <p:txEl>
+                                              <p:pRg st="1" end="1"/>
+                                            </p:txEl>
+                                          </p:spTgt>
+                                        </p:tgtEl>
+                                      </p:cBhvr>
+                                    </p:animEffect>
+                                    <p:anim calcmode="lin" valueType="num">
+                                      <p:cBhvr>
+                                        <p:cTn id="25" dur="1000" fill="hold"/>
+                                        <p:tgtEl>
+                                          <p:spTgt spid="16">
+                                            <p:txEl>
+                                              <p:pRg st="1" end="1"/>
+                                            </p:txEl>
+                                          </p:spTgt>
+                                        </p:tgtEl>
+                                        <p:attrNameLst>
+                                          <p:attrName>ppt_x</p:attrName>
+                                        </p:attrNameLst>
+                                      </p:cBhvr>
+                                      <p:tavLst>
+                                        <p:tav tm="0">
+                                          <p:val>
+                                            <p:strVal val="#ppt_x"/>
+                                          </p:val>
+                                        </p:tav>
+                                        <p:tav tm="100000">
+                                          <p:val>
+                                            <p:strVal val="#ppt_x"/>
+                                          </p:val>
+                                        </p:tav>
+                                      </p:tavLst>
+                                    </p:anim>
+                                    <p:anim calcmode="lin" valueType="num">
+                                      <p:cBhvr>
+                                        <p:cTn id="26" dur="1000" fill="hold"/>
+                                        <p:tgtEl>
+                                          <p:spTgt spid="16">
+                                            <p:txEl>
+                                              <p:pRg st="1" end="1"/>
+                                            </p:txEl>
+                                          </p:spTgt>
+                                        </p:tgtEl>
+                                        <p:attrNameLst>
+                                          <p:attrName>ppt_y</p:attrName>
+                                        </p:attrNameLst>
+                                      </p:cBhvr>
+                                      <p:tavLst>
+                                        <p:tav tm="0">
+                                          <p:val>
+                                            <p:strVal val="#ppt_y+.1"/>
+                                          </p:val>
+                                        </p:tav>
+                                        <p:tav tm="100000">
+                                          <p:val>
+                                            <p:strVal val="#ppt_y"/>
+                                          </p:val>
+                                        </p:tav>
+                                      </p:tavLst>
+                                    </p:anim>
+                                  </p:childTnLst>
+                                </p:cTn>
+                              </p:par>
+                              <p:par>
+                                <p:cTn id="27" presetID="42" presetClass="entr" presetSubtype="0" fill="hold" grpId="0" nodeType="withEffect">
+                                  <p:stCondLst>
+                                    <p:cond delay="0"/>
+                                  </p:stCondLst>
+                                  <p:childTnLst>
+                                    <p:set>
+                                      <p:cBhvr>
+                                        <p:cTn id="28" dur="1" fill="hold">
+                                          <p:stCondLst>
+                                            <p:cond delay="0"/>
+                                          </p:stCondLst>
+                                        </p:cTn>
+                                        <p:tgtEl>
+                                          <p:spTgt spid="16">
+                                            <p:txEl>
+                                              <p:pRg st="2" end="2"/>
+                                            </p:txEl>
+                                          </p:spTgt>
+                                        </p:tgtEl>
+                                        <p:attrNameLst>
+                                          <p:attrName>style.visibility</p:attrName>
+                                        </p:attrNameLst>
+                                      </p:cBhvr>
+                                      <p:to>
+                                        <p:strVal val="visible"/>
+                                      </p:to>
+                                    </p:set>
+                                    <p:animEffect transition="in" filter="fade">
+                                      <p:cBhvr>
+                                        <p:cTn id="29" dur="1000"/>
+                                        <p:tgtEl>
+                                          <p:spTgt spid="16">
+                                            <p:txEl>
+                                              <p:pRg st="2" end="2"/>
+                                            </p:txEl>
+                                          </p:spTgt>
+                                        </p:tgtEl>
+                                      </p:cBhvr>
+                                    </p:animEffect>
+                                    <p:anim calcmode="lin" valueType="num">
+                                      <p:cBhvr>
+                                        <p:cTn id="30" dur="1000" fill="hold"/>
+                                        <p:tgtEl>
+                                          <p:spTgt spid="16">
+                                            <p:txEl>
+                                              <p:pRg st="2" end="2"/>
+                                            </p:txEl>
+                                          </p:spTgt>
+                                        </p:tgtEl>
+                                        <p:attrNameLst>
+                                          <p:attrName>ppt_x</p:attrName>
+                                        </p:attrNameLst>
+                                      </p:cBhvr>
+                                      <p:tavLst>
+                                        <p:tav tm="0">
+                                          <p:val>
+                                            <p:strVal val="#ppt_x"/>
+                                          </p:val>
+                                        </p:tav>
+                                        <p:tav tm="100000">
+                                          <p:val>
+                                            <p:strVal val="#ppt_x"/>
+                                          </p:val>
+                                        </p:tav>
+                                      </p:tavLst>
+                                    </p:anim>
+                                    <p:anim calcmode="lin" valueType="num">
+                                      <p:cBhvr>
+                                        <p:cTn id="31" dur="1000" fill="hold"/>
+                                        <p:tgtEl>
+                                          <p:spTgt spid="16">
+                                            <p:txEl>
+                                              <p:pRg st="2" end="2"/>
+                                            </p:txEl>
+                                          </p:spTgt>
+                                        </p:tgtEl>
+                                        <p:attrNameLst>
+                                          <p:attrName>ppt_y</p:attrName>
+                                        </p:attrNameLst>
+                                      </p:cBhvr>
+                                      <p:tavLst>
+                                        <p:tav tm="0">
+                                          <p:val>
+                                            <p:strVal val="#ppt_y+.1"/>
+                                          </p:val>
+                                        </p:tav>
+                                        <p:tav tm="100000">
+                                          <p:val>
+                                            <p:strVal val="#ppt_y"/>
+                                          </p:val>
+                                        </p:tav>
+                                      </p:tavLst>
+                                    </p:anim>
+                                  </p:childTnLst>
+                                </p:cTn>
+                              </p:par>
+                              <p:par>
+                                <p:cTn id="32" presetID="42" presetClass="entr" presetSubtype="0" fill="hold" grpId="0" nodeType="withEffect">
+                                  <p:stCondLst>
+                                    <p:cond delay="0"/>
+                                  </p:stCondLst>
+                                  <p:childTnLst>
+                                    <p:set>
+                                      <p:cBhvr>
+                                        <p:cTn id="33" dur="1" fill="hold">
+                                          <p:stCondLst>
+                                            <p:cond delay="0"/>
+                                          </p:stCondLst>
+                                        </p:cTn>
+                                        <p:tgtEl>
+                                          <p:spTgt spid="16">
+                                            <p:txEl>
+                                              <p:pRg st="3" end="3"/>
+                                            </p:txEl>
+                                          </p:spTgt>
+                                        </p:tgtEl>
+                                        <p:attrNameLst>
+                                          <p:attrName>style.visibility</p:attrName>
+                                        </p:attrNameLst>
+                                      </p:cBhvr>
+                                      <p:to>
+                                        <p:strVal val="visible"/>
+                                      </p:to>
+                                    </p:set>
+                                    <p:animEffect transition="in" filter="fade">
+                                      <p:cBhvr>
+                                        <p:cTn id="34" dur="1000"/>
+                                        <p:tgtEl>
+                                          <p:spTgt spid="16">
+                                            <p:txEl>
+                                              <p:pRg st="3" end="3"/>
+                                            </p:txEl>
+                                          </p:spTgt>
+                                        </p:tgtEl>
+                                      </p:cBhvr>
+                                    </p:animEffect>
+                                    <p:anim calcmode="lin" valueType="num">
+                                      <p:cBhvr>
+                                        <p:cTn id="35" dur="1000" fill="hold"/>
+                                        <p:tgtEl>
+                                          <p:spTgt spid="16">
+                                            <p:txEl>
+                                              <p:pRg st="3" end="3"/>
+                                            </p:txEl>
+                                          </p:spTgt>
+                                        </p:tgtEl>
+                                        <p:attrNameLst>
+                                          <p:attrName>ppt_x</p:attrName>
+                                        </p:attrNameLst>
+                                      </p:cBhvr>
+                                      <p:tavLst>
+                                        <p:tav tm="0">
+                                          <p:val>
+                                            <p:strVal val="#ppt_x"/>
+                                          </p:val>
+                                        </p:tav>
+                                        <p:tav tm="100000">
+                                          <p:val>
+                                            <p:strVal val="#ppt_x"/>
+                                          </p:val>
+                                        </p:tav>
+                                      </p:tavLst>
+                                    </p:anim>
+                                    <p:anim calcmode="lin" valueType="num">
+                                      <p:cBhvr>
+                                        <p:cTn id="36" dur="1000" fill="hold"/>
+                                        <p:tgtEl>
+                                          <p:spTgt spid="16">
+                                            <p:txEl>
+                                              <p:pRg st="3" end="3"/>
+                                            </p:txEl>
+                                          </p:spTgt>
+                                        </p:tgtEl>
+                                        <p:attrNameLst>
+                                          <p:attrName>ppt_y</p:attrName>
+                                        </p:attrNameLst>
+                                      </p:cBhvr>
+                                      <p:tavLst>
+                                        <p:tav tm="0">
+                                          <p:val>
+                                            <p:strVal val="#ppt_y+.1"/>
+                                          </p:val>
+                                        </p:tav>
+                                        <p:tav tm="100000">
+                                          <p:val>
+                                            <p:strVal val="#ppt_y"/>
+                                          </p:val>
+                                        </p:tav>
+                                      </p:tavLst>
+                                    </p:anim>
+                                  </p:childTnLst>
+                                </p:cTn>
+                              </p:par>
+                              <p:par>
+                                <p:cTn id="37" presetID="42" presetClass="entr" presetSubtype="0" fill="hold" grpId="0" nodeType="withEffect">
+                                  <p:stCondLst>
+                                    <p:cond delay="0"/>
+                                  </p:stCondLst>
+                                  <p:childTnLst>
+                                    <p:set>
+                                      <p:cBhvr>
+                                        <p:cTn id="38" dur="1" fill="hold">
+                                          <p:stCondLst>
+                                            <p:cond delay="0"/>
+                                          </p:stCondLst>
+                                        </p:cTn>
+                                        <p:tgtEl>
+                                          <p:spTgt spid="16">
+                                            <p:txEl>
+                                              <p:pRg st="4" end="4"/>
+                                            </p:txEl>
+                                          </p:spTgt>
+                                        </p:tgtEl>
+                                        <p:attrNameLst>
+                                          <p:attrName>style.visibility</p:attrName>
+                                        </p:attrNameLst>
+                                      </p:cBhvr>
+                                      <p:to>
+                                        <p:strVal val="visible"/>
+                                      </p:to>
+                                    </p:set>
+                                    <p:animEffect transition="in" filter="fade">
+                                      <p:cBhvr>
+                                        <p:cTn id="39" dur="1000"/>
+                                        <p:tgtEl>
+                                          <p:spTgt spid="16">
+                                            <p:txEl>
+                                              <p:pRg st="4" end="4"/>
+                                            </p:txEl>
+                                          </p:spTgt>
+                                        </p:tgtEl>
+                                      </p:cBhvr>
+                                    </p:animEffect>
+                                    <p:anim calcmode="lin" valueType="num">
+                                      <p:cBhvr>
+                                        <p:cTn id="40" dur="1000" fill="hold"/>
+                                        <p:tgtEl>
+                                          <p:spTgt spid="16">
+                                            <p:txEl>
+                                              <p:pRg st="4" end="4"/>
+                                            </p:txEl>
+                                          </p:spTgt>
+                                        </p:tgtEl>
+                                        <p:attrNameLst>
+                                          <p:attrName>ppt_x</p:attrName>
+                                        </p:attrNameLst>
+                                      </p:cBhvr>
+                                      <p:tavLst>
+                                        <p:tav tm="0">
+                                          <p:val>
+                                            <p:strVal val="#ppt_x"/>
+                                          </p:val>
+                                        </p:tav>
+                                        <p:tav tm="100000">
+                                          <p:val>
+                                            <p:strVal val="#ppt_x"/>
+                                          </p:val>
+                                        </p:tav>
+                                      </p:tavLst>
+                                    </p:anim>
+                                    <p:anim calcmode="lin" valueType="num">
+                                      <p:cBhvr>
+                                        <p:cTn id="41" dur="1000" fill="hold"/>
+                                        <p:tgtEl>
+                                          <p:spTgt spid="16">
+                                            <p:txEl>
+                                              <p:pRg st="4" end="4"/>
+                                            </p:txEl>
+                                          </p:spTgt>
+                                        </p:tgtEl>
+                                        <p:attrNameLst>
+                                          <p:attrName>ppt_y</p:attrName>
+                                        </p:attrNameLst>
+                                      </p:cBhvr>
+                                      <p:tavLst>
+                                        <p:tav tm="0">
+                                          <p:val>
+                                            <p:strVal val="#ppt_y+.1"/>
+                                          </p:val>
+                                        </p:tav>
+                                        <p:tav tm="100000">
+                                          <p:val>
+                                            <p:strVal val="#ppt_y"/>
+                                          </p:val>
+                                        </p:tav>
+                                      </p:tavLst>
+                                    </p:anim>
+                                  </p:childTnLst>
+                                </p:cTn>
+                              </p:par>
+                              <p:par>
+                                <p:cTn id="42" presetID="42" presetClass="entr" presetSubtype="0" fill="hold" grpId="0" nodeType="withEffect">
+                                  <p:stCondLst>
+                                    <p:cond delay="0"/>
+                                  </p:stCondLst>
+                                  <p:childTnLst>
+                                    <p:set>
+                                      <p:cBhvr>
+                                        <p:cTn id="43" dur="1" fill="hold">
+                                          <p:stCondLst>
+                                            <p:cond delay="0"/>
+                                          </p:stCondLst>
+                                        </p:cTn>
+                                        <p:tgtEl>
+                                          <p:spTgt spid="16">
+                                            <p:txEl>
+                                              <p:pRg st="5" end="5"/>
+                                            </p:txEl>
+                                          </p:spTgt>
+                                        </p:tgtEl>
+                                        <p:attrNameLst>
+                                          <p:attrName>style.visibility</p:attrName>
+                                        </p:attrNameLst>
+                                      </p:cBhvr>
+                                      <p:to>
+                                        <p:strVal val="visible"/>
+                                      </p:to>
+                                    </p:set>
+                                    <p:animEffect transition="in" filter="fade">
+                                      <p:cBhvr>
+                                        <p:cTn id="44" dur="1000"/>
+                                        <p:tgtEl>
+                                          <p:spTgt spid="16">
+                                            <p:txEl>
+                                              <p:pRg st="5" end="5"/>
+                                            </p:txEl>
+                                          </p:spTgt>
+                                        </p:tgtEl>
+                                      </p:cBhvr>
+                                    </p:animEffect>
+                                    <p:anim calcmode="lin" valueType="num">
+                                      <p:cBhvr>
+                                        <p:cTn id="45" dur="1000" fill="hold"/>
+                                        <p:tgtEl>
+                                          <p:spTgt spid="16">
+                                            <p:txEl>
+                                              <p:pRg st="5" end="5"/>
+                                            </p:txEl>
+                                          </p:spTgt>
+                                        </p:tgtEl>
+                                        <p:attrNameLst>
+                                          <p:attrName>ppt_x</p:attrName>
+                                        </p:attrNameLst>
+                                      </p:cBhvr>
+                                      <p:tavLst>
+                                        <p:tav tm="0">
+                                          <p:val>
+                                            <p:strVal val="#ppt_x"/>
+                                          </p:val>
+                                        </p:tav>
+                                        <p:tav tm="100000">
+                                          <p:val>
+                                            <p:strVal val="#ppt_x"/>
+                                          </p:val>
+                                        </p:tav>
+                                      </p:tavLst>
+                                    </p:anim>
+                                    <p:anim calcmode="lin" valueType="num">
+                                      <p:cBhvr>
+                                        <p:cTn id="46" dur="1000" fill="hold"/>
+                                        <p:tgtEl>
+                                          <p:spTgt spid="16">
+                                            <p:txEl>
+                                              <p:pRg st="5" end="5"/>
+                                            </p:txEl>
+                                          </p:spTgt>
+                                        </p:tgtEl>
+                                        <p:attrNameLst>
+                                          <p:attrName>ppt_y</p:attrName>
+                                        </p:attrNameLst>
+                                      </p:cBhvr>
+                                      <p:tavLst>
+                                        <p:tav tm="0">
+                                          <p:val>
+                                            <p:strVal val="#ppt_y+.1"/>
+                                          </p:val>
+                                        </p:tav>
+                                        <p:tav tm="100000">
+                                          <p:val>
+                                            <p:strVal val="#ppt_y"/>
+                                          </p:val>
+                                        </p:tav>
+                                      </p:tavLst>
+                                    </p:anim>
+                                  </p:childTnLst>
+                                </p:cTn>
+                              </p:par>
+                            </p:childTnLst>
+                          </p:cTn>
+                        </p:par>
+                      </p:childTnLst>
+                    </p:cTn>
+                  </p:par>
+                  <p:par>
+                    <p:cTn id="47" fill="hold">
+                      <p:stCondLst>
+                        <p:cond delay="indefinite"/>
+                      </p:stCondLst>
+                      <p:childTnLst>
+                        <p:par>
+                          <p:cTn id="48" fill="hold">
+                            <p:stCondLst>
+                              <p:cond delay="0"/>
+                            </p:stCondLst>
+                            <p:childTnLst>
+                              <p:par>
+                                <p:cTn id="49" presetID="42" presetClass="entr" presetSubtype="0" fill="hold" nodeType="clickEffect">
+                                  <p:stCondLst>
+                                    <p:cond delay="0"/>
+                                  </p:stCondLst>
+                                  <p:childTnLst>
+                                    <p:set>
+                                      <p:cBhvr>
+                                        <p:cTn id="50" dur="1" fill="hold">
+                                          <p:stCondLst>
+                                            <p:cond delay="0"/>
+                                          </p:stCondLst>
+                                        </p:cTn>
+                                        <p:tgtEl>
+                                          <p:spTgt spid="12"/>
+                                        </p:tgtEl>
+                                        <p:attrNameLst>
+                                          <p:attrName>style.visibility</p:attrName>
+                                        </p:attrNameLst>
+                                      </p:cBhvr>
+                                      <p:to>
+                                        <p:strVal val="visible"/>
+                                      </p:to>
+                                    </p:set>
+                                    <p:animEffect transition="in" filter="fade">
+                                      <p:cBhvr>
+                                        <p:cTn id="51" dur="1000"/>
+                                        <p:tgtEl>
+                                          <p:spTgt spid="12"/>
+                                        </p:tgtEl>
+                                      </p:cBhvr>
+                                    </p:animEffect>
+                                    <p:anim calcmode="lin" valueType="num">
+                                      <p:cBhvr>
+                                        <p:cTn id="52" dur="1000" fill="hold"/>
+                                        <p:tgtEl>
+                                          <p:spTgt spid="12"/>
+                                        </p:tgtEl>
+                                        <p:attrNameLst>
+                                          <p:attrName>ppt_x</p:attrName>
+                                        </p:attrNameLst>
+                                      </p:cBhvr>
+                                      <p:tavLst>
+                                        <p:tav tm="0">
+                                          <p:val>
+                                            <p:strVal val="#ppt_x"/>
+                                          </p:val>
+                                        </p:tav>
+                                        <p:tav tm="100000">
+                                          <p:val>
+                                            <p:strVal val="#ppt_x"/>
+                                          </p:val>
+                                        </p:tav>
+                                      </p:tavLst>
+                                    </p:anim>
+                                    <p:anim calcmode="lin" valueType="num">
+                                      <p:cBhvr>
+                                        <p:cTn id="53" dur="1000" fill="hold"/>
+                                        <p:tgtEl>
+                                          <p:spTgt spid="12"/>
+                                        </p:tgtEl>
+                                        <p:attrNameLst>
+                                          <p:attrName>ppt_y</p:attrName>
+                                        </p:attrNameLst>
+                                      </p:cBhvr>
+                                      <p:tavLst>
+                                        <p:tav tm="0">
+                                          <p:val>
+                                            <p:strVal val="#ppt_y+.1"/>
+                                          </p:val>
+                                        </p:tav>
+                                        <p:tav tm="100000">
+                                          <p:val>
+                                            <p:strVal val="#ppt_y"/>
+                                          </p:val>
+                                        </p:tav>
+                                      </p:tavLst>
+                                    </p:anim>
+                                  </p:childTnLst>
+                                </p:cTn>
+                              </p:par>
+                            </p:childTnLst>
+                          </p:cTn>
+                        </p:par>
+                      </p:childTnLst>
+                    </p:cTn>
+                  </p:par>
+                </p:childTnLst>
+              </p:cTn>
+              <p:prevCondLst>
+                <p:cond evt="onPrev" delay="0">
+                  <p:tgtEl>
+                    <p:sldTgt/>
+                  </p:tgtEl>
+                </p:cond>
+              </p:prevCondLst>
+              <p:nextCondLst>
+                <p:cond evt="onNext" delay="0">
+                  <p:tgtEl>
+                    <p:sldTgt/>
+                  </p:tgtEl>
+                </p:cond>
+              </p:nextCondLst>
+            </p:seq>
+          </p:childTnLst>
+        </p:cTn>
+      </p:par>
+    </p:tnLst>
+    <p:bldLst>
+      <p:bldP spid="2" grpId="0"/>
+      <p:bldP spid="16" grpId="0" build="p"/>
+    </p:bldLst>
+  </p:timing>
+</p:sld>
+</file>
+
+<file path=ppt/slides/slide4.xml><?xml version="1.0" encoding="utf-8"?>
 <p:sld xmlns:a="http://schemas.openxmlformats.org/drawingml/2006/main" xmlns:r="http://schemas.openxmlformats.org/officeDocument/2006/relationships" xmlns:p="http://schemas.openxmlformats.org/presentationml/2006/main">
   <p:cSld>
     <p:spTree>
@@ -14842,7 +16111,7 @@
 </p:sld>
 </file>
 
-<file path=ppt/slides/slide4.xml><?xml version="1.0" encoding="utf-8"?>
+<file path=ppt/slides/slide5.xml><?xml version="1.0" encoding="utf-8"?>
 <p:sld xmlns:a="http://schemas.openxmlformats.org/drawingml/2006/main" xmlns:r="http://schemas.openxmlformats.org/officeDocument/2006/relationships" xmlns:p="http://schemas.openxmlformats.org/presentationml/2006/main">
   <p:cSld>
     <p:spTree>
@@ -15833,7 +17102,7 @@
 </p:sld>
 </file>
 
-<file path=ppt/slides/slide5.xml><?xml version="1.0" encoding="utf-8"?>
+<file path=ppt/slides/slide6.xml><?xml version="1.0" encoding="utf-8"?>
 <p:sld xmlns:a="http://schemas.openxmlformats.org/drawingml/2006/main" xmlns:r="http://schemas.openxmlformats.org/officeDocument/2006/relationships" xmlns:p="http://schemas.openxmlformats.org/presentationml/2006/main">
   <p:cSld>
     <p:spTree>
@@ -15903,7 +17172,7 @@
         </p:spPr>
         <p:txBody>
           <a:bodyPr>
-            <a:normAutofit/>
+            <a:normAutofit fontScale="92500" lnSpcReduction="20000"/>
           </a:bodyPr>
           <a:lstStyle/>
           <a:p>
@@ -15915,14 +17184,34 @@
           <a:p>
             <a:r>
               <a:rPr lang="en-IN" dirty="0"/>
-              <a:t>Docker Compose – Reference links</a:t>
+              <a:t>Docker Network Details</a:t>
             </a:r>
           </a:p>
           <a:p>
+            <a:pPr lvl="1"/>
             <a:r>
               <a:rPr lang="en-IN" dirty="0"/>
-              <a:t>YAML Quick Reference - </a:t>
+              <a:t>https://itnext.io/a-beginners-guide-to-networking-in-docker-ca5b822fb935</a:t>
             </a:r>
+          </a:p>
+          <a:p>
+            <a:r>
+              <a:rPr lang="en-IN" dirty="0"/>
+              <a:t>YAML Quick Reference </a:t>
+            </a:r>
+            <a:r>
+              <a:rPr lang="en-IN" dirty="0">
+                <a:hlinkClick r:id="rId2"/>
+              </a:rPr>
+              <a:t>–</a:t>
+            </a:r>
+            <a:r>
+              <a:rPr lang="en-IN" dirty="0"/>
+              <a:t> </a:t>
+            </a:r>
+          </a:p>
+          <a:p>
+            <a:pPr lvl="1"/>
             <a:r>
               <a:rPr lang="en-IN" dirty="0">
                 <a:hlinkClick r:id="rId2"/>
@@ -15932,21 +17221,42 @@
             <a:endParaRPr lang="en-IN" dirty="0"/>
           </a:p>
           <a:p>
+            <a:pPr lvl="1"/>
+            <a:r>
+              <a:rPr lang="en-IN" dirty="0">
+                <a:hlinkClick r:id="rId3"/>
+              </a:rPr>
+              <a:t>https://www.javatpoint.com/yaml</a:t>
+            </a:r>
+            <a:endParaRPr lang="en-IN" dirty="0"/>
+          </a:p>
+          <a:p>
             <a:r>
               <a:rPr lang="en-IN" dirty="0"/>
-              <a:t>JSON to YAML conversion</a:t>
+              <a:t>Docker Compose – Reference links</a:t>
+            </a:r>
+          </a:p>
+          <a:p>
+            <a:pPr lvl="1"/>
+            <a:r>
+              <a:rPr lang="en-IN" dirty="0">
+                <a:hlinkClick r:id="rId4"/>
+              </a:rPr>
+              <a:t>https://docs.docker.com/compose/compose-v2/</a:t>
+            </a:r>
+            <a:endParaRPr lang="en-IN" dirty="0"/>
+          </a:p>
+          <a:p>
+            <a:pPr lvl="1"/>
+            <a:r>
+              <a:rPr lang="en-IN" dirty="0"/>
+              <a:t>https://sreeninet.wordpress.com/2017/03/28/comparing-docker-compose-versions/</a:t>
             </a:r>
           </a:p>
           <a:p>
             <a:r>
               <a:rPr lang="en-IN" dirty="0"/>
               <a:t>Docker Compose Details</a:t>
-            </a:r>
-          </a:p>
-          <a:p>
-            <a:r>
-              <a:rPr lang="en-IN" dirty="0"/>
-              <a:t>Docker Network Details</a:t>
             </a:r>
           </a:p>
           <a:p>

</xml_diff>